<commit_message>
Dev: some minor stuff
</commit_message>
<xml_diff>
--- a/Docs/MasterClass.pptx
+++ b/Docs/MasterClass.pptx
@@ -6733,15 +6733,7 @@
           <a:p>
             <a:r>
               <a:rPr lang="ru-RU" dirty="0" smtClean="0"/>
-              <a:t>Основные объекты </a:t>
-            </a:r>
-            <a:r>
-              <a:rPr lang="en-US" dirty="0" smtClean="0"/>
-              <a:t>3D</a:t>
-            </a:r>
-            <a:r>
-              <a:rPr lang="ru-RU" dirty="0" smtClean="0"/>
-              <a:t> графики</a:t>
+              <a:t>Основные объекты и методы</a:t>
             </a:r>
             <a:endParaRPr lang="ru-RU" dirty="0"/>
           </a:p>
@@ -6754,13 +6746,13 @@
             <a:spLocks noGrp="1"/>
           </p:cNvSpPr>
           <p:nvPr>
-            <p:ph idx="1"/>
+            <p:ph sz="half" idx="1"/>
           </p:nvPr>
         </p:nvSpPr>
         <p:spPr/>
         <p:txBody>
           <a:bodyPr>
-            <a:normAutofit fontScale="70000" lnSpcReduction="20000"/>
+            <a:normAutofit fontScale="55000" lnSpcReduction="20000"/>
           </a:bodyPr>
           <a:lstStyle/>
           <a:p>
@@ -6913,6 +6905,217 @@
               <a:rPr lang="ru-RU" dirty="0" err="1" smtClean="0"/>
               <a:t>рендеринг</a:t>
             </a:r>
+            <a:endParaRPr lang="ru-RU" dirty="0"/>
+          </a:p>
+        </p:txBody>
+      </p:sp>
+      <p:sp>
+        <p:nvSpPr>
+          <p:cNvPr id="4" name="Содержимое 3"/>
+          <p:cNvSpPr>
+            <a:spLocks noGrp="1"/>
+          </p:cNvSpPr>
+          <p:nvPr>
+            <p:ph sz="half" idx="2"/>
+          </p:nvPr>
+        </p:nvSpPr>
+        <p:spPr/>
+        <p:txBody>
+          <a:bodyPr>
+            <a:normAutofit fontScale="55000" lnSpcReduction="20000"/>
+          </a:bodyPr>
+          <a:lstStyle/>
+          <a:p>
+            <a:r>
+              <a:rPr lang="ru-RU" dirty="0" smtClean="0"/>
+              <a:t>Методы построения освещенности</a:t>
+            </a:r>
+          </a:p>
+          <a:p>
+            <a:pPr lvl="1"/>
+            <a:r>
+              <a:rPr lang="ru-RU" dirty="0" smtClean="0"/>
+              <a:t>Модели освещения (</a:t>
+            </a:r>
+            <a:r>
+              <a:rPr lang="en-US" smtClean="0"/>
+              <a:t>BRDF</a:t>
+            </a:r>
+            <a:r>
+              <a:rPr lang="ru-RU" smtClean="0"/>
+              <a:t>)</a:t>
+            </a:r>
+          </a:p>
+          <a:p>
+            <a:pPr lvl="1"/>
+            <a:r>
+              <a:rPr lang="en-US" dirty="0" smtClean="0"/>
+              <a:t>Direct Lighting</a:t>
+            </a:r>
+            <a:endParaRPr lang="ru-RU" dirty="0" smtClean="0"/>
+          </a:p>
+          <a:p>
+            <a:pPr lvl="1"/>
+            <a:r>
+              <a:rPr lang="en-US" dirty="0" smtClean="0"/>
+              <a:t>Image bases Lighting (IBL)</a:t>
+            </a:r>
+            <a:endParaRPr lang="ru-RU" dirty="0" smtClean="0"/>
+          </a:p>
+          <a:p>
+            <a:pPr lvl="1"/>
+            <a:r>
+              <a:rPr lang="en-US" dirty="0" smtClean="0"/>
+              <a:t>Global Illumination (GI)</a:t>
+            </a:r>
+          </a:p>
+          <a:p>
+            <a:pPr lvl="1"/>
+            <a:r>
+              <a:rPr lang="en-US" dirty="0" err="1" smtClean="0"/>
+              <a:t>Realtime</a:t>
+            </a:r>
+            <a:r>
+              <a:rPr lang="en-US" dirty="0" smtClean="0"/>
+              <a:t> </a:t>
+            </a:r>
+            <a:r>
+              <a:rPr lang="en-US" dirty="0" err="1" smtClean="0"/>
+              <a:t>vs</a:t>
+            </a:r>
+            <a:r>
+              <a:rPr lang="en-US" dirty="0" smtClean="0"/>
+              <a:t> Baked lighting (</a:t>
+            </a:r>
+            <a:r>
+              <a:rPr lang="en-US" dirty="0" err="1" smtClean="0"/>
+              <a:t>Lightmaps</a:t>
+            </a:r>
+            <a:r>
+              <a:rPr lang="en-US" dirty="0" smtClean="0"/>
+              <a:t>)</a:t>
+            </a:r>
+          </a:p>
+          <a:p>
+            <a:pPr lvl="2"/>
+            <a:r>
+              <a:rPr lang="en-US" dirty="0" smtClean="0"/>
+              <a:t>Spherical </a:t>
+            </a:r>
+            <a:r>
+              <a:rPr lang="en-US" dirty="0" smtClean="0"/>
+              <a:t>Harmonics</a:t>
+            </a:r>
+            <a:endParaRPr lang="ru-RU" dirty="0" smtClean="0"/>
+          </a:p>
+          <a:p>
+            <a:r>
+              <a:rPr lang="ru-RU" dirty="0" smtClean="0"/>
+              <a:t>Методы построения</a:t>
+            </a:r>
+            <a:r>
+              <a:rPr lang="en-US" dirty="0" smtClean="0"/>
+              <a:t> </a:t>
+            </a:r>
+            <a:r>
+              <a:rPr lang="ru-RU" dirty="0" smtClean="0"/>
+              <a:t>теней</a:t>
+            </a:r>
+          </a:p>
+          <a:p>
+            <a:pPr lvl="1"/>
+            <a:r>
+              <a:rPr lang="en-US" dirty="0" smtClean="0"/>
+              <a:t>Ray tracing (baked)</a:t>
+            </a:r>
+            <a:endParaRPr lang="ru-RU" dirty="0" smtClean="0"/>
+          </a:p>
+          <a:p>
+            <a:pPr lvl="1"/>
+            <a:r>
+              <a:rPr lang="en-US" dirty="0" smtClean="0"/>
+              <a:t>Shadow Maps</a:t>
+            </a:r>
+          </a:p>
+          <a:p>
+            <a:pPr lvl="2"/>
+            <a:r>
+              <a:rPr lang="en-US" dirty="0" smtClean="0"/>
+              <a:t>Perspective SM</a:t>
+            </a:r>
+          </a:p>
+          <a:p>
+            <a:pPr lvl="2"/>
+            <a:r>
+              <a:rPr lang="en-US" dirty="0" smtClean="0"/>
+              <a:t>Variance SM</a:t>
+            </a:r>
+          </a:p>
+          <a:p>
+            <a:pPr lvl="2"/>
+            <a:r>
+              <a:rPr lang="en-US" dirty="0" smtClean="0"/>
+              <a:t>PSSM</a:t>
+            </a:r>
+          </a:p>
+          <a:p>
+            <a:pPr lvl="1"/>
+            <a:r>
+              <a:rPr lang="en-US" dirty="0" smtClean="0"/>
+              <a:t>Shadow Volumes</a:t>
+            </a:r>
+          </a:p>
+          <a:p>
+            <a:r>
+              <a:rPr lang="ru-RU" dirty="0" smtClean="0"/>
+              <a:t>Методы анимации</a:t>
+            </a:r>
+          </a:p>
+          <a:p>
+            <a:pPr lvl="1"/>
+            <a:r>
+              <a:rPr lang="en-US" dirty="0" smtClean="0"/>
+              <a:t>Blend shapes</a:t>
+            </a:r>
+          </a:p>
+          <a:p>
+            <a:pPr lvl="1"/>
+            <a:r>
+              <a:rPr lang="en-US" dirty="0" smtClean="0"/>
+              <a:t>Skinning</a:t>
+            </a:r>
+          </a:p>
+          <a:p>
+            <a:r>
+              <a:rPr lang="ru-RU" dirty="0" smtClean="0"/>
+              <a:t>Моделирование природных явлений</a:t>
+            </a:r>
+          </a:p>
+          <a:p>
+            <a:pPr lvl="1"/>
+            <a:r>
+              <a:rPr lang="ru-RU" dirty="0" smtClean="0"/>
+              <a:t>Туман</a:t>
+            </a:r>
+          </a:p>
+          <a:p>
+            <a:pPr lvl="1"/>
+            <a:r>
+              <a:rPr lang="ru-RU" dirty="0" smtClean="0"/>
+              <a:t>Растительность</a:t>
+            </a:r>
+          </a:p>
+          <a:p>
+            <a:pPr lvl="1"/>
+            <a:r>
+              <a:rPr lang="ru-RU" dirty="0" smtClean="0"/>
+              <a:t>Системы частиц</a:t>
+            </a:r>
+          </a:p>
+          <a:p>
+            <a:endParaRPr lang="en-US" dirty="0" smtClean="0"/>
+          </a:p>
+          <a:p>
             <a:endParaRPr lang="ru-RU" dirty="0"/>
           </a:p>
         </p:txBody>
@@ -7207,7 +7410,7 @@
           </a:bodyPr>
           <a:lstStyle/>
           <a:p>
-            <a:endParaRPr lang="ru-RU"/>
+            <a:endParaRPr lang="ru-RU" dirty="0"/>
           </a:p>
         </p:txBody>
       </p:sp>

</xml_diff>